<commit_message>
Se agrega archivo xml_query
</commit_message>
<xml_diff>
--- a/Ponencias/Manejo de XML con SQL Server.pptx
+++ b/Ponencias/Manejo de XML con SQL Server.pptx
@@ -24,8 +24,17 @@
     <p:sldId id="273" r:id="rId18"/>
     <p:sldId id="275" r:id="rId19"/>
     <p:sldId id="276" r:id="rId20"/>
-    <p:sldId id="277" r:id="rId21"/>
-    <p:sldId id="264" r:id="rId22"/>
+    <p:sldId id="286" r:id="rId21"/>
+    <p:sldId id="277" r:id="rId22"/>
+    <p:sldId id="278" r:id="rId23"/>
+    <p:sldId id="279" r:id="rId24"/>
+    <p:sldId id="280" r:id="rId25"/>
+    <p:sldId id="283" r:id="rId26"/>
+    <p:sldId id="282" r:id="rId27"/>
+    <p:sldId id="281" r:id="rId28"/>
+    <p:sldId id="285" r:id="rId29"/>
+    <p:sldId id="264" r:id="rId30"/>
+    <p:sldId id="284" r:id="rId31"/>
   </p:sldIdLst>
   <p:sldSz cx="12192000" cy="6858000"/>
   <p:notesSz cx="6858000" cy="9144000"/>
@@ -124,6 +133,11 @@
       </a:defRPr>
     </a:lvl9pPr>
   </p:defaultTextStyle>
+  <p:extLst>
+    <p:ext uri="{EFAFB233-063F-42B5-8137-9DF3F51BA10A}">
+      <p15:sldGuideLst xmlns:p15="http://schemas.microsoft.com/office/powerpoint/2012/main"/>
+    </p:ext>
+  </p:extLst>
 </p:presentation>
 </file>
 
@@ -872,7 +886,7 @@
           <a:p>
             <a:fld id="{ADB51CAA-D688-4FA7-B564-9FEE076E0823}" type="datetimeFigureOut">
               <a:rPr lang="es-MX" smtClean="0"/>
-              <a:t>02/07/2019</a:t>
+              <a:t>10/07/2019</a:t>
             </a:fld>
             <a:endParaRPr lang="es-MX"/>
           </a:p>
@@ -1123,7 +1137,7 @@
           <a:p>
             <a:fld id="{ADB51CAA-D688-4FA7-B564-9FEE076E0823}" type="datetimeFigureOut">
               <a:rPr lang="es-MX" smtClean="0"/>
-              <a:t>02/07/2019</a:t>
+              <a:t>10/07/2019</a:t>
             </a:fld>
             <a:endParaRPr lang="es-MX"/>
           </a:p>
@@ -1437,7 +1451,7 @@
           <a:p>
             <a:fld id="{ADB51CAA-D688-4FA7-B564-9FEE076E0823}" type="datetimeFigureOut">
               <a:rPr lang="es-MX" smtClean="0"/>
-              <a:t>02/07/2019</a:t>
+              <a:t>10/07/2019</a:t>
             </a:fld>
             <a:endParaRPr lang="es-MX"/>
           </a:p>
@@ -1770,7 +1784,7 @@
           <a:p>
             <a:fld id="{ADB51CAA-D688-4FA7-B564-9FEE076E0823}" type="datetimeFigureOut">
               <a:rPr lang="es-MX" smtClean="0"/>
-              <a:t>02/07/2019</a:t>
+              <a:t>10/07/2019</a:t>
             </a:fld>
             <a:endParaRPr lang="es-MX"/>
           </a:p>
@@ -2084,7 +2098,7 @@
           <a:p>
             <a:fld id="{ADB51CAA-D688-4FA7-B564-9FEE076E0823}" type="datetimeFigureOut">
               <a:rPr lang="es-MX" smtClean="0"/>
-              <a:t>02/07/2019</a:t>
+              <a:t>10/07/2019</a:t>
             </a:fld>
             <a:endParaRPr lang="es-MX"/>
           </a:p>
@@ -2477,7 +2491,7 @@
           <a:p>
             <a:fld id="{ADB51CAA-D688-4FA7-B564-9FEE076E0823}" type="datetimeFigureOut">
               <a:rPr lang="es-MX" smtClean="0"/>
-              <a:t>02/07/2019</a:t>
+              <a:t>10/07/2019</a:t>
             </a:fld>
             <a:endParaRPr lang="es-MX"/>
           </a:p>
@@ -2647,7 +2661,7 @@
           <a:p>
             <a:fld id="{ADB51CAA-D688-4FA7-B564-9FEE076E0823}" type="datetimeFigureOut">
               <a:rPr lang="es-MX" smtClean="0"/>
-              <a:t>02/07/2019</a:t>
+              <a:t>10/07/2019</a:t>
             </a:fld>
             <a:endParaRPr lang="es-MX"/>
           </a:p>
@@ -2827,7 +2841,7 @@
           <a:p>
             <a:fld id="{ADB51CAA-D688-4FA7-B564-9FEE076E0823}" type="datetimeFigureOut">
               <a:rPr lang="es-MX" smtClean="0"/>
-              <a:t>02/07/2019</a:t>
+              <a:t>10/07/2019</a:t>
             </a:fld>
             <a:endParaRPr lang="es-MX"/>
           </a:p>
@@ -2997,7 +3011,7 @@
           <a:p>
             <a:fld id="{ADB51CAA-D688-4FA7-B564-9FEE076E0823}" type="datetimeFigureOut">
               <a:rPr lang="es-MX" smtClean="0"/>
-              <a:t>02/07/2019</a:t>
+              <a:t>10/07/2019</a:t>
             </a:fld>
             <a:endParaRPr lang="es-MX"/>
           </a:p>
@@ -3244,7 +3258,7 @@
           <a:p>
             <a:fld id="{ADB51CAA-D688-4FA7-B564-9FEE076E0823}" type="datetimeFigureOut">
               <a:rPr lang="es-MX" smtClean="0"/>
-              <a:t>02/07/2019</a:t>
+              <a:t>10/07/2019</a:t>
             </a:fld>
             <a:endParaRPr lang="es-MX"/>
           </a:p>
@@ -3476,7 +3490,7 @@
           <a:p>
             <a:fld id="{ADB51CAA-D688-4FA7-B564-9FEE076E0823}" type="datetimeFigureOut">
               <a:rPr lang="es-MX" smtClean="0"/>
-              <a:t>02/07/2019</a:t>
+              <a:t>10/07/2019</a:t>
             </a:fld>
             <a:endParaRPr lang="es-MX"/>
           </a:p>
@@ -3850,7 +3864,7 @@
           <a:p>
             <a:fld id="{ADB51CAA-D688-4FA7-B564-9FEE076E0823}" type="datetimeFigureOut">
               <a:rPr lang="es-MX" smtClean="0"/>
-              <a:t>02/07/2019</a:t>
+              <a:t>10/07/2019</a:t>
             </a:fld>
             <a:endParaRPr lang="es-MX"/>
           </a:p>
@@ -3973,7 +3987,7 @@
           <a:p>
             <a:fld id="{ADB51CAA-D688-4FA7-B564-9FEE076E0823}" type="datetimeFigureOut">
               <a:rPr lang="es-MX" smtClean="0"/>
-              <a:t>02/07/2019</a:t>
+              <a:t>10/07/2019</a:t>
             </a:fld>
             <a:endParaRPr lang="es-MX"/>
           </a:p>
@@ -4068,7 +4082,7 @@
           <a:p>
             <a:fld id="{ADB51CAA-D688-4FA7-B564-9FEE076E0823}" type="datetimeFigureOut">
               <a:rPr lang="es-MX" smtClean="0"/>
-              <a:t>02/07/2019</a:t>
+              <a:t>10/07/2019</a:t>
             </a:fld>
             <a:endParaRPr lang="es-MX"/>
           </a:p>
@@ -4323,7 +4337,7 @@
           <a:p>
             <a:fld id="{ADB51CAA-D688-4FA7-B564-9FEE076E0823}" type="datetimeFigureOut">
               <a:rPr lang="es-MX" smtClean="0"/>
-              <a:t>02/07/2019</a:t>
+              <a:t>10/07/2019</a:t>
             </a:fld>
             <a:endParaRPr lang="es-MX"/>
           </a:p>
@@ -4628,7 +4642,7 @@
           <a:p>
             <a:fld id="{ADB51CAA-D688-4FA7-B564-9FEE076E0823}" type="datetimeFigureOut">
               <a:rPr lang="es-MX" smtClean="0"/>
-              <a:t>02/07/2019</a:t>
+              <a:t>10/07/2019</a:t>
             </a:fld>
             <a:endParaRPr lang="es-MX"/>
           </a:p>
@@ -5330,7 +5344,7 @@
           <a:p>
             <a:fld id="{ADB51CAA-D688-4FA7-B564-9FEE076E0823}" type="datetimeFigureOut">
               <a:rPr lang="es-MX" smtClean="0"/>
-              <a:t>02/07/2019</a:t>
+              <a:t>10/07/2019</a:t>
             </a:fld>
             <a:endParaRPr lang="es-MX"/>
           </a:p>
@@ -7631,25 +7645,36 @@
               <a:buAutoNum type="alphaLcPeriod"/>
             </a:pPr>
             <a:r>
-              <a:rPr lang="es-MX" dirty="0"/>
+              <a:rPr lang="es-MX" dirty="0">
+                <a:hlinkClick r:id="rId7" action="ppaction://hlinksldjump"/>
+              </a:rPr>
               <a:t>Método </a:t>
             </a:r>
             <a:r>
-              <a:rPr lang="es-MX" dirty="0" err="1"/>
+              <a:rPr lang="es-MX" dirty="0" err="1">
+                <a:hlinkClick r:id="rId7" action="ppaction://hlinksldjump"/>
+              </a:rPr>
               <a:t>query</a:t>
             </a:r>
             <a:r>
-              <a:rPr lang="es-MX" dirty="0"/>
+              <a:rPr lang="es-MX" dirty="0">
+                <a:hlinkClick r:id="rId7" action="ppaction://hlinksldjump"/>
+              </a:rPr>
               <a:t>() y </a:t>
             </a:r>
             <a:r>
-              <a:rPr lang="es-MX" dirty="0" err="1"/>
+              <a:rPr lang="es-MX" dirty="0" err="1">
+                <a:hlinkClick r:id="rId7" action="ppaction://hlinksldjump"/>
+              </a:rPr>
               <a:t>modify</a:t>
             </a:r>
             <a:r>
-              <a:rPr lang="es-MX" dirty="0"/>
+              <a:rPr lang="es-MX" dirty="0">
+                <a:hlinkClick r:id="rId7" action="ppaction://hlinksldjump"/>
+              </a:rPr>
               <a:t>()</a:t>
             </a:r>
+            <a:endParaRPr lang="es-MX" dirty="0"/>
           </a:p>
           <a:p>
             <a:pPr marL="800100" lvl="1" indent="-342900">
@@ -7708,7 +7733,7 @@
             </a:pPr>
             <a:r>
               <a:rPr lang="es-MX" dirty="0">
-                <a:hlinkClick r:id="rId7" action="ppaction://hlinksldjump"/>
+                <a:hlinkClick r:id="rId8" action="ppaction://hlinksldjump"/>
               </a:rPr>
               <a:t>Referencias</a:t>
             </a:r>
@@ -7766,10 +7791,10 @@
       </p:grpSpPr>
       <p:sp>
         <p:nvSpPr>
-          <p:cNvPr id="2" name="Title 1">
+          <p:cNvPr id="4" name="Title 3">
             <a:extLst>
               <a:ext uri="{FF2B5EF4-FFF2-40B4-BE49-F238E27FC236}">
-                <a16:creationId xmlns:a16="http://schemas.microsoft.com/office/drawing/2014/main" id="{603D5BC7-8A44-4458-9906-C0DABF54E918}"/>
+                <a16:creationId xmlns:a16="http://schemas.microsoft.com/office/drawing/2014/main" id="{D16715D3-99AA-4BB3-A02B-3E522AF426D0}"/>
               </a:ext>
             </a:extLst>
           </p:cNvPr>
@@ -7786,37 +7811,28 @@
           <a:lstStyle/>
           <a:p>
             <a:r>
+              <a:rPr lang="es-MX" dirty="0"/>
+              <a:t>Método </a:t>
+            </a:r>
+            <a:r>
               <a:rPr lang="es-MX" dirty="0" err="1"/>
-              <a:t>nodes</a:t>
+              <a:t>query</a:t>
+            </a:r>
+            <a:r>
+              <a:rPr lang="es-MX" dirty="0"/>
+              <a:t>() y </a:t>
+            </a:r>
+            <a:r>
+              <a:rPr lang="es-MX" dirty="0" err="1"/>
+              <a:t>modify</a:t>
             </a:r>
             <a:r>
               <a:rPr lang="es-MX" dirty="0"/>
               <a:t>()</a:t>
             </a:r>
-          </a:p>
-        </p:txBody>
-      </p:sp>
-      <p:sp>
-        <p:nvSpPr>
-          <p:cNvPr id="3" name="Content Placeholder 2">
-            <a:extLst>
-              <a:ext uri="{FF2B5EF4-FFF2-40B4-BE49-F238E27FC236}">
-                <a16:creationId xmlns:a16="http://schemas.microsoft.com/office/drawing/2014/main" id="{29FA8A00-D0EA-4A04-B26A-D9495B84C07A}"/>
-              </a:ext>
-            </a:extLst>
-          </p:cNvPr>
-          <p:cNvSpPr>
-            <a:spLocks noGrp="1"/>
-          </p:cNvSpPr>
-          <p:nvPr>
-            <p:ph idx="1"/>
-          </p:nvPr>
-        </p:nvSpPr>
-        <p:spPr/>
-        <p:txBody>
-          <a:bodyPr/>
-          <a:lstStyle/>
-          <a:p>
+            <a:br>
+              <a:rPr lang="es-MX" dirty="0"/>
+            </a:br>
             <a:endParaRPr lang="es-MX" dirty="0"/>
           </a:p>
         </p:txBody>
@@ -7824,7 +7840,7 @@
     </p:spTree>
     <p:extLst>
       <p:ext uri="{BB962C8B-B14F-4D97-AF65-F5344CB8AC3E}">
-        <p14:creationId xmlns:p14="http://schemas.microsoft.com/office/powerpoint/2010/main" val="3471596905"/>
+        <p14:creationId xmlns:p14="http://schemas.microsoft.com/office/powerpoint/2010/main" val="2007662614"/>
       </p:ext>
     </p:extLst>
   </p:cSld>
@@ -7856,6 +7872,1413 @@
           <p:cNvPr id="2" name="Title 1">
             <a:extLst>
               <a:ext uri="{FF2B5EF4-FFF2-40B4-BE49-F238E27FC236}">
+                <a16:creationId xmlns:a16="http://schemas.microsoft.com/office/drawing/2014/main" id="{603D5BC7-8A44-4458-9906-C0DABF54E918}"/>
+              </a:ext>
+            </a:extLst>
+          </p:cNvPr>
+          <p:cNvSpPr>
+            <a:spLocks noGrp="1"/>
+          </p:cNvSpPr>
+          <p:nvPr>
+            <p:ph type="title"/>
+          </p:nvPr>
+        </p:nvSpPr>
+        <p:spPr/>
+        <p:txBody>
+          <a:bodyPr/>
+          <a:lstStyle/>
+          <a:p>
+            <a:r>
+              <a:rPr lang="es-MX" dirty="0" err="1"/>
+              <a:t>query</a:t>
+            </a:r>
+            <a:r>
+              <a:rPr lang="es-MX" dirty="0"/>
+              <a:t>()</a:t>
+            </a:r>
+          </a:p>
+        </p:txBody>
+      </p:sp>
+      <p:sp>
+        <p:nvSpPr>
+          <p:cNvPr id="3" name="Content Placeholder 2">
+            <a:extLst>
+              <a:ext uri="{FF2B5EF4-FFF2-40B4-BE49-F238E27FC236}">
+                <a16:creationId xmlns:a16="http://schemas.microsoft.com/office/drawing/2014/main" id="{29FA8A00-D0EA-4A04-B26A-D9495B84C07A}"/>
+              </a:ext>
+            </a:extLst>
+          </p:cNvPr>
+          <p:cNvSpPr>
+            <a:spLocks noGrp="1"/>
+          </p:cNvSpPr>
+          <p:nvPr>
+            <p:ph idx="1"/>
+          </p:nvPr>
+        </p:nvSpPr>
+        <p:spPr/>
+        <p:txBody>
+          <a:bodyPr/>
+          <a:lstStyle/>
+          <a:p>
+            <a:r>
+              <a:rPr lang="es-MX" dirty="0"/>
+              <a:t>Especifica una expresión </a:t>
+            </a:r>
+            <a:r>
+              <a:rPr lang="es-MX" dirty="0" err="1"/>
+              <a:t>XQuery</a:t>
+            </a:r>
+            <a:r>
+              <a:rPr lang="es-MX" dirty="0"/>
+              <a:t> en una instancia del tipo de datos </a:t>
+            </a:r>
+            <a:r>
+              <a:rPr lang="es-MX" b="1" dirty="0" err="1"/>
+              <a:t>xml</a:t>
+            </a:r>
+            <a:r>
+              <a:rPr lang="es-MX" dirty="0"/>
+              <a:t>. </a:t>
+            </a:r>
+          </a:p>
+          <a:p>
+            <a:r>
+              <a:rPr lang="es-MX" dirty="0"/>
+              <a:t>El resultado es de tipo </a:t>
+            </a:r>
+            <a:r>
+              <a:rPr lang="es-MX" b="1" dirty="0" err="1"/>
+              <a:t>xml</a:t>
+            </a:r>
+            <a:endParaRPr lang="es-MX" b="1" dirty="0"/>
+          </a:p>
+          <a:p>
+            <a:endParaRPr lang="es-MX" b="1" dirty="0"/>
+          </a:p>
+          <a:p>
+            <a:r>
+              <a:rPr lang="es-MX" b="1" dirty="0"/>
+              <a:t>Sintaxis</a:t>
+            </a:r>
+          </a:p>
+          <a:p>
+            <a:pPr marL="0" indent="0">
+              <a:buNone/>
+            </a:pPr>
+            <a:r>
+              <a:rPr lang="es-MX" dirty="0"/>
+              <a:t>	</a:t>
+            </a:r>
+            <a:r>
+              <a:rPr lang="es-MX" dirty="0" err="1"/>
+              <a:t>query</a:t>
+            </a:r>
+            <a:r>
+              <a:rPr lang="es-MX" dirty="0"/>
+              <a:t> ('</a:t>
+            </a:r>
+            <a:r>
+              <a:rPr lang="es-MX" dirty="0" err="1"/>
+              <a:t>XQuery</a:t>
+            </a:r>
+            <a:r>
+              <a:rPr lang="es-MX" dirty="0"/>
+              <a:t>’) </a:t>
+            </a:r>
+          </a:p>
+          <a:p>
+            <a:endParaRPr lang="es-MX" dirty="0"/>
+          </a:p>
+          <a:p>
+            <a:r>
+              <a:rPr lang="es-MX" b="1" dirty="0"/>
+              <a:t>Argumentos</a:t>
+            </a:r>
+          </a:p>
+          <a:p>
+            <a:pPr marL="0" indent="0">
+              <a:buNone/>
+            </a:pPr>
+            <a:r>
+              <a:rPr lang="es-MX" dirty="0"/>
+              <a:t>	</a:t>
+            </a:r>
+            <a:r>
+              <a:rPr lang="es-MX" dirty="0" err="1"/>
+              <a:t>XQuery</a:t>
+            </a:r>
+            <a:br>
+              <a:rPr lang="es-MX" dirty="0"/>
+            </a:br>
+            <a:r>
+              <a:rPr lang="es-MX" dirty="0"/>
+              <a:t>	Es una cadena, una expresión </a:t>
+            </a:r>
+            <a:r>
+              <a:rPr lang="es-MX" dirty="0" err="1"/>
+              <a:t>XQuery</a:t>
+            </a:r>
+            <a:r>
+              <a:rPr lang="es-MX" dirty="0"/>
+              <a:t>, que consulta nodos XML como, por 	ejemplo, elementos y atributos, en una instancia XML.</a:t>
+            </a:r>
+          </a:p>
+        </p:txBody>
+      </p:sp>
+    </p:spTree>
+    <p:extLst>
+      <p:ext uri="{BB962C8B-B14F-4D97-AF65-F5344CB8AC3E}">
+        <p14:creationId xmlns:p14="http://schemas.microsoft.com/office/powerpoint/2010/main" val="3471596905"/>
+      </p:ext>
+    </p:extLst>
+  </p:cSld>
+  <p:clrMapOvr>
+    <a:masterClrMapping/>
+  </p:clrMapOvr>
+</p:sld>
+</file>
+
+<file path=ppt/slides/slide22.xml><?xml version="1.0" encoding="utf-8"?>
+<p:sld xmlns:a="http://schemas.openxmlformats.org/drawingml/2006/main" xmlns:r="http://schemas.openxmlformats.org/officeDocument/2006/relationships" xmlns:p="http://schemas.openxmlformats.org/presentationml/2006/main">
+  <p:cSld>
+    <p:spTree>
+      <p:nvGrpSpPr>
+        <p:cNvPr id="1" name=""/>
+        <p:cNvGrpSpPr/>
+        <p:nvPr/>
+      </p:nvGrpSpPr>
+      <p:grpSpPr>
+        <a:xfrm>
+          <a:off x="0" y="0"/>
+          <a:ext cx="0" cy="0"/>
+          <a:chOff x="0" y="0"/>
+          <a:chExt cx="0" cy="0"/>
+        </a:xfrm>
+      </p:grpSpPr>
+      <p:sp>
+        <p:nvSpPr>
+          <p:cNvPr id="2" name="Title 1">
+            <a:extLst>
+              <a:ext uri="{FF2B5EF4-FFF2-40B4-BE49-F238E27FC236}">
+                <a16:creationId xmlns:a16="http://schemas.microsoft.com/office/drawing/2014/main" id="{603D5BC7-8A44-4458-9906-C0DABF54E918}"/>
+              </a:ext>
+            </a:extLst>
+          </p:cNvPr>
+          <p:cNvSpPr>
+            <a:spLocks noGrp="1"/>
+          </p:cNvSpPr>
+          <p:nvPr>
+            <p:ph type="title"/>
+          </p:nvPr>
+        </p:nvSpPr>
+        <p:spPr/>
+        <p:txBody>
+          <a:bodyPr/>
+          <a:lstStyle/>
+          <a:p>
+            <a:r>
+              <a:rPr lang="es-MX" dirty="0" err="1"/>
+              <a:t>modify</a:t>
+            </a:r>
+            <a:r>
+              <a:rPr lang="es-MX" dirty="0"/>
+              <a:t>()</a:t>
+            </a:r>
+          </a:p>
+        </p:txBody>
+      </p:sp>
+      <p:sp>
+        <p:nvSpPr>
+          <p:cNvPr id="3" name="Content Placeholder 2">
+            <a:extLst>
+              <a:ext uri="{FF2B5EF4-FFF2-40B4-BE49-F238E27FC236}">
+                <a16:creationId xmlns:a16="http://schemas.microsoft.com/office/drawing/2014/main" id="{29FA8A00-D0EA-4A04-B26A-D9495B84C07A}"/>
+              </a:ext>
+            </a:extLst>
+          </p:cNvPr>
+          <p:cNvSpPr>
+            <a:spLocks noGrp="1"/>
+          </p:cNvSpPr>
+          <p:nvPr>
+            <p:ph idx="1"/>
+          </p:nvPr>
+        </p:nvSpPr>
+        <p:spPr/>
+        <p:txBody>
+          <a:bodyPr>
+            <a:normAutofit fontScale="92500" lnSpcReduction="10000"/>
+          </a:bodyPr>
+          <a:lstStyle/>
+          <a:p>
+            <a:pPr>
+              <a:lnSpc>
+                <a:spcPct val="150000"/>
+              </a:lnSpc>
+            </a:pPr>
+            <a:r>
+              <a:rPr lang="es-MX" dirty="0"/>
+              <a:t>Modifica el contenido de un documento XML. </a:t>
+            </a:r>
+          </a:p>
+          <a:p>
+            <a:pPr>
+              <a:lnSpc>
+                <a:spcPct val="150000"/>
+              </a:lnSpc>
+            </a:pPr>
+            <a:r>
+              <a:rPr lang="es-MX" dirty="0"/>
+              <a:t>Use este método para modificar el contenido de una columna o variable de tipo </a:t>
+            </a:r>
+            <a:r>
+              <a:rPr lang="es-MX" b="1" dirty="0" err="1"/>
+              <a:t>xml</a:t>
+            </a:r>
+            <a:r>
+              <a:rPr lang="es-MX" dirty="0"/>
+              <a:t>. </a:t>
+            </a:r>
+          </a:p>
+          <a:p>
+            <a:pPr>
+              <a:lnSpc>
+                <a:spcPct val="150000"/>
+              </a:lnSpc>
+            </a:pPr>
+            <a:r>
+              <a:rPr lang="es-MX" dirty="0"/>
+              <a:t>Este método toma una instrucción XML DML para insertar, actualizar o eliminar nodos a partir de datos XML. </a:t>
+            </a:r>
+          </a:p>
+          <a:p>
+            <a:pPr>
+              <a:lnSpc>
+                <a:spcPct val="150000"/>
+              </a:lnSpc>
+            </a:pPr>
+            <a:r>
+              <a:rPr lang="es-MX" dirty="0"/>
+              <a:t>El método </a:t>
+            </a:r>
+            <a:r>
+              <a:rPr lang="es-MX" b="1" dirty="0" err="1"/>
+              <a:t>modify</a:t>
+            </a:r>
+            <a:r>
+              <a:rPr lang="es-MX" b="1" dirty="0"/>
+              <a:t>()</a:t>
+            </a:r>
+            <a:r>
+              <a:rPr lang="es-MX" dirty="0"/>
+              <a:t> del tipo de datos </a:t>
+            </a:r>
+            <a:r>
+              <a:rPr lang="es-MX" b="1" dirty="0" err="1"/>
+              <a:t>xml</a:t>
+            </a:r>
+            <a:r>
+              <a:rPr lang="es-MX" dirty="0"/>
+              <a:t> solo se puede usar en la cláusula SET de una instrucción UPDATE.</a:t>
+            </a:r>
+          </a:p>
+          <a:p>
+            <a:pPr>
+              <a:lnSpc>
+                <a:spcPct val="150000"/>
+              </a:lnSpc>
+            </a:pPr>
+            <a:r>
+              <a:rPr lang="es-MX" dirty="0"/>
+              <a:t>Se devuelve un error si se llama al método </a:t>
+            </a:r>
+            <a:r>
+              <a:rPr lang="es-MX" b="1" dirty="0" err="1"/>
+              <a:t>modify</a:t>
+            </a:r>
+            <a:r>
+              <a:rPr lang="es-MX" b="1" dirty="0"/>
+              <a:t>()</a:t>
+            </a:r>
+            <a:r>
+              <a:rPr lang="es-MX" dirty="0"/>
+              <a:t> sobre un valor NULL o da como resultado un valor NULL.</a:t>
+            </a:r>
+          </a:p>
+        </p:txBody>
+      </p:sp>
+    </p:spTree>
+    <p:extLst>
+      <p:ext uri="{BB962C8B-B14F-4D97-AF65-F5344CB8AC3E}">
+        <p14:creationId xmlns:p14="http://schemas.microsoft.com/office/powerpoint/2010/main" val="2982553350"/>
+      </p:ext>
+    </p:extLst>
+  </p:cSld>
+  <p:clrMapOvr>
+    <a:masterClrMapping/>
+  </p:clrMapOvr>
+</p:sld>
+</file>
+
+<file path=ppt/slides/slide23.xml><?xml version="1.0" encoding="utf-8"?>
+<p:sld xmlns:a="http://schemas.openxmlformats.org/drawingml/2006/main" xmlns:r="http://schemas.openxmlformats.org/officeDocument/2006/relationships" xmlns:p="http://schemas.openxmlformats.org/presentationml/2006/main">
+  <p:cSld>
+    <p:spTree>
+      <p:nvGrpSpPr>
+        <p:cNvPr id="1" name=""/>
+        <p:cNvGrpSpPr/>
+        <p:nvPr/>
+      </p:nvGrpSpPr>
+      <p:grpSpPr>
+        <a:xfrm>
+          <a:off x="0" y="0"/>
+          <a:ext cx="0" cy="0"/>
+          <a:chOff x="0" y="0"/>
+          <a:chExt cx="0" cy="0"/>
+        </a:xfrm>
+      </p:grpSpPr>
+      <p:sp>
+        <p:nvSpPr>
+          <p:cNvPr id="2" name="Title 1">
+            <a:extLst>
+              <a:ext uri="{FF2B5EF4-FFF2-40B4-BE49-F238E27FC236}">
+                <a16:creationId xmlns:a16="http://schemas.microsoft.com/office/drawing/2014/main" id="{603D5BC7-8A44-4458-9906-C0DABF54E918}"/>
+              </a:ext>
+            </a:extLst>
+          </p:cNvPr>
+          <p:cNvSpPr>
+            <a:spLocks noGrp="1"/>
+          </p:cNvSpPr>
+          <p:nvPr>
+            <p:ph type="title"/>
+          </p:nvPr>
+        </p:nvSpPr>
+        <p:spPr/>
+        <p:txBody>
+          <a:bodyPr/>
+          <a:lstStyle/>
+          <a:p>
+            <a:r>
+              <a:rPr lang="es-MX" dirty="0" err="1"/>
+              <a:t>modify</a:t>
+            </a:r>
+            <a:r>
+              <a:rPr lang="es-MX" dirty="0"/>
+              <a:t>()</a:t>
+            </a:r>
+          </a:p>
+        </p:txBody>
+      </p:sp>
+      <p:sp>
+        <p:nvSpPr>
+          <p:cNvPr id="3" name="Content Placeholder 2">
+            <a:extLst>
+              <a:ext uri="{FF2B5EF4-FFF2-40B4-BE49-F238E27FC236}">
+                <a16:creationId xmlns:a16="http://schemas.microsoft.com/office/drawing/2014/main" id="{29FA8A00-D0EA-4A04-B26A-D9495B84C07A}"/>
+              </a:ext>
+            </a:extLst>
+          </p:cNvPr>
+          <p:cNvSpPr>
+            <a:spLocks noGrp="1"/>
+          </p:cNvSpPr>
+          <p:nvPr>
+            <p:ph idx="1"/>
+          </p:nvPr>
+        </p:nvSpPr>
+        <p:spPr/>
+        <p:txBody>
+          <a:bodyPr/>
+          <a:lstStyle/>
+          <a:p>
+            <a:pPr>
+              <a:lnSpc>
+                <a:spcPct val="150000"/>
+              </a:lnSpc>
+            </a:pPr>
+            <a:r>
+              <a:rPr lang="es-MX" dirty="0" err="1"/>
+              <a:t>insert</a:t>
+            </a:r>
+            <a:r>
+              <a:rPr lang="es-MX" dirty="0"/>
+              <a:t> </a:t>
+            </a:r>
+          </a:p>
+          <a:p>
+            <a:pPr marL="0" indent="0">
+              <a:lnSpc>
+                <a:spcPct val="150000"/>
+              </a:lnSpc>
+              <a:buNone/>
+            </a:pPr>
+            <a:r>
+              <a:rPr lang="es-MX" dirty="0"/>
+              <a:t>Inserta uno o más nodos identificados por </a:t>
+            </a:r>
+            <a:r>
+              <a:rPr lang="es-MX" b="1" i="1" dirty="0"/>
+              <a:t>Expression1</a:t>
+            </a:r>
+            <a:r>
+              <a:rPr lang="es-MX" dirty="0"/>
+              <a:t> como nodos secundarios o del mismo nivel que el nodo identificado por </a:t>
+            </a:r>
+            <a:r>
+              <a:rPr lang="es-MX" b="1" i="1" dirty="0"/>
+              <a:t>Expression2</a:t>
+            </a:r>
+            <a:r>
+              <a:rPr lang="es-MX" dirty="0"/>
+              <a:t>.</a:t>
+            </a:r>
+          </a:p>
+          <a:p>
+            <a:pPr marL="0" indent="0">
+              <a:lnSpc>
+                <a:spcPct val="150000"/>
+              </a:lnSpc>
+              <a:buNone/>
+            </a:pPr>
+            <a:r>
+              <a:rPr lang="es-MX" dirty="0"/>
+              <a:t>			</a:t>
+            </a:r>
+          </a:p>
+          <a:p>
+            <a:pPr marL="0" indent="0">
+              <a:lnSpc>
+                <a:spcPct val="150000"/>
+              </a:lnSpc>
+              <a:buNone/>
+            </a:pPr>
+            <a:r>
+              <a:rPr lang="en-US" dirty="0"/>
+              <a:t>insert </a:t>
+            </a:r>
+            <a:r>
+              <a:rPr lang="en-US" b="1" dirty="0"/>
+              <a:t>Expression1</a:t>
+            </a:r>
+            <a:r>
+              <a:rPr lang="en-US" dirty="0"/>
+              <a:t> ( {as first | as last} into | after | before </a:t>
+            </a:r>
+            <a:r>
+              <a:rPr lang="en-US" b="1" dirty="0"/>
+              <a:t>Expression2</a:t>
+            </a:r>
+            <a:r>
+              <a:rPr lang="en-US" dirty="0"/>
+              <a:t> ) </a:t>
+            </a:r>
+            <a:endParaRPr lang="es-MX" dirty="0"/>
+          </a:p>
+        </p:txBody>
+      </p:sp>
+    </p:spTree>
+    <p:extLst>
+      <p:ext uri="{BB962C8B-B14F-4D97-AF65-F5344CB8AC3E}">
+        <p14:creationId xmlns:p14="http://schemas.microsoft.com/office/powerpoint/2010/main" val="3386950877"/>
+      </p:ext>
+    </p:extLst>
+  </p:cSld>
+  <p:clrMapOvr>
+    <a:masterClrMapping/>
+  </p:clrMapOvr>
+</p:sld>
+</file>
+
+<file path=ppt/slides/slide24.xml><?xml version="1.0" encoding="utf-8"?>
+<p:sld xmlns:a="http://schemas.openxmlformats.org/drawingml/2006/main" xmlns:r="http://schemas.openxmlformats.org/officeDocument/2006/relationships" xmlns:p="http://schemas.openxmlformats.org/presentationml/2006/main">
+  <p:cSld>
+    <p:spTree>
+      <p:nvGrpSpPr>
+        <p:cNvPr id="1" name=""/>
+        <p:cNvGrpSpPr/>
+        <p:nvPr/>
+      </p:nvGrpSpPr>
+      <p:grpSpPr>
+        <a:xfrm>
+          <a:off x="0" y="0"/>
+          <a:ext cx="0" cy="0"/>
+          <a:chOff x="0" y="0"/>
+          <a:chExt cx="0" cy="0"/>
+        </a:xfrm>
+      </p:grpSpPr>
+      <p:sp>
+        <p:nvSpPr>
+          <p:cNvPr id="2" name="Title 1">
+            <a:extLst>
+              <a:ext uri="{FF2B5EF4-FFF2-40B4-BE49-F238E27FC236}">
+                <a16:creationId xmlns:a16="http://schemas.microsoft.com/office/drawing/2014/main" id="{603D5BC7-8A44-4458-9906-C0DABF54E918}"/>
+              </a:ext>
+            </a:extLst>
+          </p:cNvPr>
+          <p:cNvSpPr>
+            <a:spLocks noGrp="1"/>
+          </p:cNvSpPr>
+          <p:nvPr>
+            <p:ph type="title"/>
+          </p:nvPr>
+        </p:nvSpPr>
+        <p:spPr/>
+        <p:txBody>
+          <a:bodyPr/>
+          <a:lstStyle/>
+          <a:p>
+            <a:r>
+              <a:rPr lang="es-MX" dirty="0" err="1"/>
+              <a:t>modify</a:t>
+            </a:r>
+            <a:r>
+              <a:rPr lang="es-MX" dirty="0"/>
+              <a:t>()</a:t>
+            </a:r>
+          </a:p>
+        </p:txBody>
+      </p:sp>
+      <p:sp>
+        <p:nvSpPr>
+          <p:cNvPr id="3" name="Content Placeholder 2">
+            <a:extLst>
+              <a:ext uri="{FF2B5EF4-FFF2-40B4-BE49-F238E27FC236}">
+                <a16:creationId xmlns:a16="http://schemas.microsoft.com/office/drawing/2014/main" id="{29FA8A00-D0EA-4A04-B26A-D9495B84C07A}"/>
+              </a:ext>
+            </a:extLst>
+          </p:cNvPr>
+          <p:cNvSpPr>
+            <a:spLocks noGrp="1"/>
+          </p:cNvSpPr>
+          <p:nvPr>
+            <p:ph idx="1"/>
+          </p:nvPr>
+        </p:nvSpPr>
+        <p:spPr/>
+        <p:txBody>
+          <a:bodyPr>
+            <a:normAutofit/>
+          </a:bodyPr>
+          <a:lstStyle/>
+          <a:p>
+            <a:pPr marL="0" indent="0">
+              <a:lnSpc>
+                <a:spcPct val="150000"/>
+              </a:lnSpc>
+              <a:buNone/>
+            </a:pPr>
+            <a:r>
+              <a:rPr lang="es-MX" dirty="0" err="1"/>
+              <a:t>Into</a:t>
+            </a:r>
+            <a:endParaRPr lang="es-MX" dirty="0"/>
+          </a:p>
+          <a:p>
+            <a:pPr>
+              <a:lnSpc>
+                <a:spcPct val="150000"/>
+              </a:lnSpc>
+            </a:pPr>
+            <a:r>
+              <a:rPr lang="es-MX" dirty="0"/>
+              <a:t>Los nodos identificados por </a:t>
+            </a:r>
+            <a:r>
+              <a:rPr lang="es-MX" i="1" dirty="0"/>
+              <a:t>Expression1</a:t>
+            </a:r>
+            <a:r>
+              <a:rPr lang="es-MX" dirty="0"/>
+              <a:t> se insertan como descendientes directos (nodos secundarios) del nodo identificado por </a:t>
+            </a:r>
+            <a:r>
+              <a:rPr lang="es-MX" i="1" dirty="0"/>
+              <a:t>Expression2</a:t>
+            </a:r>
+            <a:r>
+              <a:rPr lang="es-MX" dirty="0"/>
+              <a:t>. </a:t>
+            </a:r>
+          </a:p>
+          <a:p>
+            <a:pPr>
+              <a:lnSpc>
+                <a:spcPct val="150000"/>
+              </a:lnSpc>
+            </a:pPr>
+            <a:r>
+              <a:rPr lang="es-MX" dirty="0"/>
+              <a:t>Si el nodo de </a:t>
+            </a:r>
+            <a:r>
+              <a:rPr lang="es-MX" i="1" dirty="0"/>
+              <a:t>Expression2</a:t>
+            </a:r>
+            <a:r>
+              <a:rPr lang="es-MX" dirty="0"/>
+              <a:t> ya tiene uno o más nodos secundarios, se debe usar </a:t>
+            </a:r>
+            <a:r>
+              <a:rPr lang="es-MX" b="1" dirty="0"/>
+              <a:t>as </a:t>
+            </a:r>
+            <a:r>
+              <a:rPr lang="es-MX" b="1" dirty="0" err="1"/>
+              <a:t>first</a:t>
+            </a:r>
+            <a:r>
+              <a:rPr lang="es-MX" dirty="0"/>
+              <a:t> o </a:t>
+            </a:r>
+            <a:r>
+              <a:rPr lang="es-MX" b="1" dirty="0"/>
+              <a:t>as </a:t>
+            </a:r>
+            <a:r>
+              <a:rPr lang="es-MX" b="1" dirty="0" err="1"/>
+              <a:t>last</a:t>
+            </a:r>
+            <a:r>
+              <a:rPr lang="es-MX" dirty="0"/>
+              <a:t> para especificar dónde se quiere agregar el nuevo nodo. Se agregaría al principio o al final de la lista de nodos secundarios respectivamente. </a:t>
+            </a:r>
+          </a:p>
+          <a:p>
+            <a:pPr>
+              <a:lnSpc>
+                <a:spcPct val="150000"/>
+              </a:lnSpc>
+            </a:pPr>
+            <a:r>
+              <a:rPr lang="es-MX" dirty="0"/>
+              <a:t>Las palabras clave </a:t>
+            </a:r>
+            <a:r>
+              <a:rPr lang="es-MX" b="1" dirty="0"/>
+              <a:t>as </a:t>
+            </a:r>
+            <a:r>
+              <a:rPr lang="es-MX" b="1" dirty="0" err="1"/>
+              <a:t>first</a:t>
+            </a:r>
+            <a:r>
+              <a:rPr lang="es-MX" dirty="0"/>
+              <a:t> y </a:t>
+            </a:r>
+            <a:r>
+              <a:rPr lang="es-MX" b="1" dirty="0"/>
+              <a:t>as </a:t>
+            </a:r>
+            <a:r>
+              <a:rPr lang="es-MX" b="1" dirty="0" err="1"/>
+              <a:t>last</a:t>
+            </a:r>
+            <a:r>
+              <a:rPr lang="es-MX" dirty="0"/>
+              <a:t> se omiten cuando se insertan atributos.</a:t>
+            </a:r>
+          </a:p>
+        </p:txBody>
+      </p:sp>
+    </p:spTree>
+    <p:extLst>
+      <p:ext uri="{BB962C8B-B14F-4D97-AF65-F5344CB8AC3E}">
+        <p14:creationId xmlns:p14="http://schemas.microsoft.com/office/powerpoint/2010/main" val="2611367350"/>
+      </p:ext>
+    </p:extLst>
+  </p:cSld>
+  <p:clrMapOvr>
+    <a:masterClrMapping/>
+  </p:clrMapOvr>
+</p:sld>
+</file>
+
+<file path=ppt/slides/slide25.xml><?xml version="1.0" encoding="utf-8"?>
+<p:sld xmlns:a="http://schemas.openxmlformats.org/drawingml/2006/main" xmlns:r="http://schemas.openxmlformats.org/officeDocument/2006/relationships" xmlns:p="http://schemas.openxmlformats.org/presentationml/2006/main">
+  <p:cSld>
+    <p:spTree>
+      <p:nvGrpSpPr>
+        <p:cNvPr id="1" name=""/>
+        <p:cNvGrpSpPr/>
+        <p:nvPr/>
+      </p:nvGrpSpPr>
+      <p:grpSpPr>
+        <a:xfrm>
+          <a:off x="0" y="0"/>
+          <a:ext cx="0" cy="0"/>
+          <a:chOff x="0" y="0"/>
+          <a:chExt cx="0" cy="0"/>
+        </a:xfrm>
+      </p:grpSpPr>
+      <p:sp>
+        <p:nvSpPr>
+          <p:cNvPr id="2" name="Title 1">
+            <a:extLst>
+              <a:ext uri="{FF2B5EF4-FFF2-40B4-BE49-F238E27FC236}">
+                <a16:creationId xmlns:a16="http://schemas.microsoft.com/office/drawing/2014/main" id="{603D5BC7-8A44-4458-9906-C0DABF54E918}"/>
+              </a:ext>
+            </a:extLst>
+          </p:cNvPr>
+          <p:cNvSpPr>
+            <a:spLocks noGrp="1"/>
+          </p:cNvSpPr>
+          <p:nvPr>
+            <p:ph type="title"/>
+          </p:nvPr>
+        </p:nvSpPr>
+        <p:spPr/>
+        <p:txBody>
+          <a:bodyPr/>
+          <a:lstStyle/>
+          <a:p>
+            <a:r>
+              <a:rPr lang="es-MX" dirty="0" err="1"/>
+              <a:t>modify</a:t>
+            </a:r>
+            <a:r>
+              <a:rPr lang="es-MX" dirty="0"/>
+              <a:t>()</a:t>
+            </a:r>
+          </a:p>
+        </p:txBody>
+      </p:sp>
+      <p:sp>
+        <p:nvSpPr>
+          <p:cNvPr id="3" name="Content Placeholder 2">
+            <a:extLst>
+              <a:ext uri="{FF2B5EF4-FFF2-40B4-BE49-F238E27FC236}">
+                <a16:creationId xmlns:a16="http://schemas.microsoft.com/office/drawing/2014/main" id="{29FA8A00-D0EA-4A04-B26A-D9495B84C07A}"/>
+              </a:ext>
+            </a:extLst>
+          </p:cNvPr>
+          <p:cNvSpPr>
+            <a:spLocks noGrp="1"/>
+          </p:cNvSpPr>
+          <p:nvPr>
+            <p:ph idx="1"/>
+          </p:nvPr>
+        </p:nvSpPr>
+        <p:spPr/>
+        <p:txBody>
+          <a:bodyPr/>
+          <a:lstStyle/>
+          <a:p>
+            <a:pPr marL="0" indent="0">
+              <a:lnSpc>
+                <a:spcPct val="150000"/>
+              </a:lnSpc>
+              <a:buNone/>
+            </a:pPr>
+            <a:r>
+              <a:rPr lang="es-MX" dirty="0"/>
+              <a:t>after</a:t>
+            </a:r>
+          </a:p>
+          <a:p>
+            <a:pPr>
+              <a:lnSpc>
+                <a:spcPct val="150000"/>
+              </a:lnSpc>
+            </a:pPr>
+            <a:r>
+              <a:rPr lang="es-MX" dirty="0"/>
+              <a:t>Los nodos identificados por </a:t>
+            </a:r>
+            <a:r>
+              <a:rPr lang="es-MX" i="1" dirty="0"/>
+              <a:t>Expression1</a:t>
+            </a:r>
+            <a:r>
+              <a:rPr lang="es-MX" dirty="0"/>
+              <a:t> se insertan como nodos del mismo nivel justo después del nodo identificado por </a:t>
+            </a:r>
+            <a:r>
+              <a:rPr lang="es-MX" i="1" dirty="0"/>
+              <a:t>Expression2</a:t>
+            </a:r>
+            <a:r>
+              <a:rPr lang="es-MX" dirty="0"/>
+              <a:t>. </a:t>
+            </a:r>
+          </a:p>
+          <a:p>
+            <a:pPr>
+              <a:lnSpc>
+                <a:spcPct val="150000"/>
+              </a:lnSpc>
+            </a:pPr>
+            <a:r>
+              <a:rPr lang="es-MX" dirty="0"/>
+              <a:t>La palabra clave </a:t>
+            </a:r>
+            <a:r>
+              <a:rPr lang="es-MX" b="1" dirty="0"/>
+              <a:t>after</a:t>
+            </a:r>
+            <a:r>
+              <a:rPr lang="es-MX" dirty="0"/>
+              <a:t> no se puede usar para insertar atributos. Por ejemplo, no se puede utilizar para insertar un constructor de atributos o devolver un atributo desde una consulta </a:t>
+            </a:r>
+            <a:r>
+              <a:rPr lang="es-MX" dirty="0" err="1"/>
+              <a:t>XQuery</a:t>
+            </a:r>
+            <a:r>
+              <a:rPr lang="es-MX" dirty="0"/>
+              <a:t>.</a:t>
+            </a:r>
+          </a:p>
+        </p:txBody>
+      </p:sp>
+    </p:spTree>
+    <p:extLst>
+      <p:ext uri="{BB962C8B-B14F-4D97-AF65-F5344CB8AC3E}">
+        <p14:creationId xmlns:p14="http://schemas.microsoft.com/office/powerpoint/2010/main" val="620458098"/>
+      </p:ext>
+    </p:extLst>
+  </p:cSld>
+  <p:clrMapOvr>
+    <a:masterClrMapping/>
+  </p:clrMapOvr>
+</p:sld>
+</file>
+
+<file path=ppt/slides/slide26.xml><?xml version="1.0" encoding="utf-8"?>
+<p:sld xmlns:a="http://schemas.openxmlformats.org/drawingml/2006/main" xmlns:r="http://schemas.openxmlformats.org/officeDocument/2006/relationships" xmlns:p="http://schemas.openxmlformats.org/presentationml/2006/main">
+  <p:cSld>
+    <p:spTree>
+      <p:nvGrpSpPr>
+        <p:cNvPr id="1" name=""/>
+        <p:cNvGrpSpPr/>
+        <p:nvPr/>
+      </p:nvGrpSpPr>
+      <p:grpSpPr>
+        <a:xfrm>
+          <a:off x="0" y="0"/>
+          <a:ext cx="0" cy="0"/>
+          <a:chOff x="0" y="0"/>
+          <a:chExt cx="0" cy="0"/>
+        </a:xfrm>
+      </p:grpSpPr>
+      <p:sp>
+        <p:nvSpPr>
+          <p:cNvPr id="2" name="Title 1">
+            <a:extLst>
+              <a:ext uri="{FF2B5EF4-FFF2-40B4-BE49-F238E27FC236}">
+                <a16:creationId xmlns:a16="http://schemas.microsoft.com/office/drawing/2014/main" id="{603D5BC7-8A44-4458-9906-C0DABF54E918}"/>
+              </a:ext>
+            </a:extLst>
+          </p:cNvPr>
+          <p:cNvSpPr>
+            <a:spLocks noGrp="1"/>
+          </p:cNvSpPr>
+          <p:nvPr>
+            <p:ph type="title"/>
+          </p:nvPr>
+        </p:nvSpPr>
+        <p:spPr/>
+        <p:txBody>
+          <a:bodyPr/>
+          <a:lstStyle/>
+          <a:p>
+            <a:r>
+              <a:rPr lang="es-MX" dirty="0" err="1"/>
+              <a:t>modify</a:t>
+            </a:r>
+            <a:r>
+              <a:rPr lang="es-MX" dirty="0"/>
+              <a:t>()</a:t>
+            </a:r>
+          </a:p>
+        </p:txBody>
+      </p:sp>
+      <p:sp>
+        <p:nvSpPr>
+          <p:cNvPr id="3" name="Content Placeholder 2">
+            <a:extLst>
+              <a:ext uri="{FF2B5EF4-FFF2-40B4-BE49-F238E27FC236}">
+                <a16:creationId xmlns:a16="http://schemas.microsoft.com/office/drawing/2014/main" id="{29FA8A00-D0EA-4A04-B26A-D9495B84C07A}"/>
+              </a:ext>
+            </a:extLst>
+          </p:cNvPr>
+          <p:cNvSpPr>
+            <a:spLocks noGrp="1"/>
+          </p:cNvSpPr>
+          <p:nvPr>
+            <p:ph idx="1"/>
+          </p:nvPr>
+        </p:nvSpPr>
+        <p:spPr/>
+        <p:txBody>
+          <a:bodyPr/>
+          <a:lstStyle/>
+          <a:p>
+            <a:pPr marL="0" indent="0">
+              <a:lnSpc>
+                <a:spcPct val="150000"/>
+              </a:lnSpc>
+              <a:buNone/>
+            </a:pPr>
+            <a:r>
+              <a:rPr lang="es-MX" dirty="0" err="1"/>
+              <a:t>before</a:t>
+            </a:r>
+            <a:endParaRPr lang="es-MX" dirty="0"/>
+          </a:p>
+          <a:p>
+            <a:pPr>
+              <a:lnSpc>
+                <a:spcPct val="150000"/>
+              </a:lnSpc>
+            </a:pPr>
+            <a:r>
+              <a:rPr lang="es-MX" dirty="0"/>
+              <a:t>Los nodos identificados por </a:t>
+            </a:r>
+            <a:r>
+              <a:rPr lang="es-MX" i="1" dirty="0"/>
+              <a:t>Expression1</a:t>
+            </a:r>
+            <a:r>
+              <a:rPr lang="es-MX" dirty="0"/>
+              <a:t> se insertan como nodos del mismo nivel justo antes del nodo identificado por </a:t>
+            </a:r>
+            <a:r>
+              <a:rPr lang="es-MX" i="1" dirty="0"/>
+              <a:t>Expression2</a:t>
+            </a:r>
+            <a:r>
+              <a:rPr lang="es-MX" dirty="0"/>
+              <a:t>. </a:t>
+            </a:r>
+          </a:p>
+          <a:p>
+            <a:pPr>
+              <a:lnSpc>
+                <a:spcPct val="150000"/>
+              </a:lnSpc>
+            </a:pPr>
+            <a:r>
+              <a:rPr lang="es-MX" dirty="0"/>
+              <a:t>La palabra clave </a:t>
+            </a:r>
+            <a:r>
+              <a:rPr lang="es-MX" b="1" dirty="0" err="1"/>
+              <a:t>before</a:t>
+            </a:r>
+            <a:r>
+              <a:rPr lang="es-MX" dirty="0"/>
+              <a:t> no se puede usar cuando se insertan atributos. Por ejemplo, no se puede utilizar para insertar un constructor de atributos o devolver un atributo desde una consulta </a:t>
+            </a:r>
+            <a:r>
+              <a:rPr lang="es-MX" dirty="0" err="1"/>
+              <a:t>XQuery</a:t>
+            </a:r>
+            <a:r>
+              <a:rPr lang="es-MX" dirty="0"/>
+              <a:t>.</a:t>
+            </a:r>
+          </a:p>
+        </p:txBody>
+      </p:sp>
+    </p:spTree>
+    <p:extLst>
+      <p:ext uri="{BB962C8B-B14F-4D97-AF65-F5344CB8AC3E}">
+        <p14:creationId xmlns:p14="http://schemas.microsoft.com/office/powerpoint/2010/main" val="2642901690"/>
+      </p:ext>
+    </p:extLst>
+  </p:cSld>
+  <p:clrMapOvr>
+    <a:masterClrMapping/>
+  </p:clrMapOvr>
+</p:sld>
+</file>
+
+<file path=ppt/slides/slide27.xml><?xml version="1.0" encoding="utf-8"?>
+<p:sld xmlns:a="http://schemas.openxmlformats.org/drawingml/2006/main" xmlns:r="http://schemas.openxmlformats.org/officeDocument/2006/relationships" xmlns:p="http://schemas.openxmlformats.org/presentationml/2006/main">
+  <p:cSld>
+    <p:spTree>
+      <p:nvGrpSpPr>
+        <p:cNvPr id="1" name=""/>
+        <p:cNvGrpSpPr/>
+        <p:nvPr/>
+      </p:nvGrpSpPr>
+      <p:grpSpPr>
+        <a:xfrm>
+          <a:off x="0" y="0"/>
+          <a:ext cx="0" cy="0"/>
+          <a:chOff x="0" y="0"/>
+          <a:chExt cx="0" cy="0"/>
+        </a:xfrm>
+      </p:grpSpPr>
+      <p:sp>
+        <p:nvSpPr>
+          <p:cNvPr id="2" name="Title 1">
+            <a:extLst>
+              <a:ext uri="{FF2B5EF4-FFF2-40B4-BE49-F238E27FC236}">
+                <a16:creationId xmlns:a16="http://schemas.microsoft.com/office/drawing/2014/main" id="{603D5BC7-8A44-4458-9906-C0DABF54E918}"/>
+              </a:ext>
+            </a:extLst>
+          </p:cNvPr>
+          <p:cNvSpPr>
+            <a:spLocks noGrp="1"/>
+          </p:cNvSpPr>
+          <p:nvPr>
+            <p:ph type="title"/>
+          </p:nvPr>
+        </p:nvSpPr>
+        <p:spPr/>
+        <p:txBody>
+          <a:bodyPr/>
+          <a:lstStyle/>
+          <a:p>
+            <a:r>
+              <a:rPr lang="es-MX" dirty="0" err="1"/>
+              <a:t>modify</a:t>
+            </a:r>
+            <a:r>
+              <a:rPr lang="es-MX" dirty="0"/>
+              <a:t>()</a:t>
+            </a:r>
+          </a:p>
+        </p:txBody>
+      </p:sp>
+      <p:sp>
+        <p:nvSpPr>
+          <p:cNvPr id="3" name="Content Placeholder 2">
+            <a:extLst>
+              <a:ext uri="{FF2B5EF4-FFF2-40B4-BE49-F238E27FC236}">
+                <a16:creationId xmlns:a16="http://schemas.microsoft.com/office/drawing/2014/main" id="{29FA8A00-D0EA-4A04-B26A-D9495B84C07A}"/>
+              </a:ext>
+            </a:extLst>
+          </p:cNvPr>
+          <p:cNvSpPr>
+            <a:spLocks noGrp="1"/>
+          </p:cNvSpPr>
+          <p:nvPr>
+            <p:ph idx="1"/>
+          </p:nvPr>
+        </p:nvSpPr>
+        <p:spPr/>
+        <p:txBody>
+          <a:bodyPr>
+            <a:normAutofit fontScale="92500" lnSpcReduction="10000"/>
+          </a:bodyPr>
+          <a:lstStyle/>
+          <a:p>
+            <a:pPr>
+              <a:lnSpc>
+                <a:spcPct val="150000"/>
+              </a:lnSpc>
+            </a:pPr>
+            <a:r>
+              <a:rPr lang="es-MX" dirty="0" err="1"/>
+              <a:t>delete</a:t>
+            </a:r>
+            <a:endParaRPr lang="es-MX" dirty="0"/>
+          </a:p>
+          <a:p>
+            <a:pPr marL="0" indent="0">
+              <a:lnSpc>
+                <a:spcPct val="150000"/>
+              </a:lnSpc>
+              <a:buNone/>
+            </a:pPr>
+            <a:r>
+              <a:rPr lang="es-MX" dirty="0"/>
+              <a:t>Elimina nodos de una instancia XML.</a:t>
+            </a:r>
+          </a:p>
+          <a:p>
+            <a:pPr marL="0" indent="0">
+              <a:lnSpc>
+                <a:spcPct val="150000"/>
+              </a:lnSpc>
+              <a:buNone/>
+            </a:pPr>
+            <a:endParaRPr lang="es-MX" dirty="0"/>
+          </a:p>
+          <a:p>
+            <a:pPr marL="0" indent="0">
+              <a:lnSpc>
+                <a:spcPct val="150000"/>
+              </a:lnSpc>
+              <a:buNone/>
+            </a:pPr>
+            <a:r>
+              <a:rPr lang="es-MX" b="1" dirty="0"/>
+              <a:t>Sintaxis</a:t>
+            </a:r>
+          </a:p>
+          <a:p>
+            <a:pPr marL="0" indent="0">
+              <a:lnSpc>
+                <a:spcPct val="150000"/>
+              </a:lnSpc>
+              <a:buNone/>
+            </a:pPr>
+            <a:r>
+              <a:rPr lang="es-MX" dirty="0" err="1"/>
+              <a:t>delete</a:t>
+            </a:r>
+            <a:r>
+              <a:rPr lang="es-MX" dirty="0"/>
+              <a:t> </a:t>
+            </a:r>
+            <a:r>
+              <a:rPr lang="es-MX" dirty="0" err="1"/>
+              <a:t>Expression</a:t>
+            </a:r>
+            <a:r>
+              <a:rPr lang="es-MX" dirty="0"/>
+              <a:t> </a:t>
+            </a:r>
+          </a:p>
+          <a:p>
+            <a:pPr marL="0" indent="0">
+              <a:lnSpc>
+                <a:spcPct val="150000"/>
+              </a:lnSpc>
+              <a:buNone/>
+            </a:pPr>
+            <a:endParaRPr lang="es-MX" dirty="0"/>
+          </a:p>
+          <a:p>
+            <a:pPr marL="0" indent="0">
+              <a:buNone/>
+            </a:pPr>
+            <a:r>
+              <a:rPr lang="es-MX" b="1" dirty="0"/>
+              <a:t>Argumentos</a:t>
+            </a:r>
+          </a:p>
+          <a:p>
+            <a:pPr marL="0" indent="0">
+              <a:buNone/>
+            </a:pPr>
+            <a:r>
+              <a:rPr lang="es-MX" i="1" dirty="0"/>
+              <a:t>Expresión</a:t>
+            </a:r>
+            <a:br>
+              <a:rPr lang="es-MX" dirty="0"/>
+            </a:br>
+            <a:r>
+              <a:rPr lang="es-MX" dirty="0"/>
+              <a:t>Es una expresión </a:t>
+            </a:r>
+            <a:r>
+              <a:rPr lang="es-MX" dirty="0" err="1"/>
+              <a:t>XQuery</a:t>
+            </a:r>
+            <a:r>
+              <a:rPr lang="es-MX" dirty="0"/>
+              <a:t> que identifica los nodos que se deben eliminar. </a:t>
+            </a:r>
+          </a:p>
+          <a:p>
+            <a:pPr marL="0" indent="0">
+              <a:lnSpc>
+                <a:spcPct val="150000"/>
+              </a:lnSpc>
+              <a:buNone/>
+            </a:pPr>
+            <a:endParaRPr lang="es-MX" dirty="0"/>
+          </a:p>
+        </p:txBody>
+      </p:sp>
+    </p:spTree>
+    <p:extLst>
+      <p:ext uri="{BB962C8B-B14F-4D97-AF65-F5344CB8AC3E}">
+        <p14:creationId xmlns:p14="http://schemas.microsoft.com/office/powerpoint/2010/main" val="3581237273"/>
+      </p:ext>
+    </p:extLst>
+  </p:cSld>
+  <p:clrMapOvr>
+    <a:masterClrMapping/>
+  </p:clrMapOvr>
+</p:sld>
+</file>
+
+<file path=ppt/slides/slide28.xml><?xml version="1.0" encoding="utf-8"?>
+<p:sld xmlns:a="http://schemas.openxmlformats.org/drawingml/2006/main" xmlns:r="http://schemas.openxmlformats.org/officeDocument/2006/relationships" xmlns:p="http://schemas.openxmlformats.org/presentationml/2006/main">
+  <p:cSld>
+    <p:spTree>
+      <p:nvGrpSpPr>
+        <p:cNvPr id="1" name=""/>
+        <p:cNvGrpSpPr/>
+        <p:nvPr/>
+      </p:nvGrpSpPr>
+      <p:grpSpPr>
+        <a:xfrm>
+          <a:off x="0" y="0"/>
+          <a:ext cx="0" cy="0"/>
+          <a:chOff x="0" y="0"/>
+          <a:chExt cx="0" cy="0"/>
+        </a:xfrm>
+      </p:grpSpPr>
+      <p:sp>
+        <p:nvSpPr>
+          <p:cNvPr id="2" name="Title 1">
+            <a:extLst>
+              <a:ext uri="{FF2B5EF4-FFF2-40B4-BE49-F238E27FC236}">
+                <a16:creationId xmlns:a16="http://schemas.microsoft.com/office/drawing/2014/main" id="{603D5BC7-8A44-4458-9906-C0DABF54E918}"/>
+              </a:ext>
+            </a:extLst>
+          </p:cNvPr>
+          <p:cNvSpPr>
+            <a:spLocks noGrp="1"/>
+          </p:cNvSpPr>
+          <p:nvPr>
+            <p:ph type="title"/>
+          </p:nvPr>
+        </p:nvSpPr>
+        <p:spPr/>
+        <p:txBody>
+          <a:bodyPr/>
+          <a:lstStyle/>
+          <a:p>
+            <a:r>
+              <a:rPr lang="es-MX" dirty="0" err="1"/>
+              <a:t>modify</a:t>
+            </a:r>
+            <a:r>
+              <a:rPr lang="es-MX" dirty="0"/>
+              <a:t>()</a:t>
+            </a:r>
+          </a:p>
+        </p:txBody>
+      </p:sp>
+      <p:sp>
+        <p:nvSpPr>
+          <p:cNvPr id="3" name="Content Placeholder 2">
+            <a:extLst>
+              <a:ext uri="{FF2B5EF4-FFF2-40B4-BE49-F238E27FC236}">
+                <a16:creationId xmlns:a16="http://schemas.microsoft.com/office/drawing/2014/main" id="{29FA8A00-D0EA-4A04-B26A-D9495B84C07A}"/>
+              </a:ext>
+            </a:extLst>
+          </p:cNvPr>
+          <p:cNvSpPr>
+            <a:spLocks noGrp="1"/>
+          </p:cNvSpPr>
+          <p:nvPr>
+            <p:ph idx="1"/>
+          </p:nvPr>
+        </p:nvSpPr>
+        <p:spPr/>
+        <p:txBody>
+          <a:bodyPr>
+            <a:normAutofit/>
+          </a:bodyPr>
+          <a:lstStyle/>
+          <a:p>
+            <a:pPr>
+              <a:lnSpc>
+                <a:spcPct val="150000"/>
+              </a:lnSpc>
+            </a:pPr>
+            <a:r>
+              <a:rPr lang="es-MX" dirty="0" err="1"/>
+              <a:t>replace</a:t>
+            </a:r>
+            <a:r>
+              <a:rPr lang="es-MX" dirty="0"/>
+              <a:t> </a:t>
+            </a:r>
+            <a:r>
+              <a:rPr lang="es-MX" dirty="0" err="1"/>
+              <a:t>value</a:t>
+            </a:r>
+            <a:r>
+              <a:rPr lang="es-MX" dirty="0"/>
+              <a:t> </a:t>
+            </a:r>
+            <a:r>
+              <a:rPr lang="es-MX" dirty="0" err="1"/>
+              <a:t>of</a:t>
+            </a:r>
+            <a:endParaRPr lang="es-MX" dirty="0"/>
+          </a:p>
+          <a:p>
+            <a:pPr marL="0" indent="0">
+              <a:lnSpc>
+                <a:spcPct val="150000"/>
+              </a:lnSpc>
+              <a:buNone/>
+            </a:pPr>
+            <a:r>
+              <a:rPr lang="es-MX" dirty="0"/>
+              <a:t>Actualiza el valor de un nodo en el documento.</a:t>
+            </a:r>
+          </a:p>
+          <a:p>
+            <a:pPr marL="0" indent="0">
+              <a:lnSpc>
+                <a:spcPct val="150000"/>
+              </a:lnSpc>
+              <a:buNone/>
+            </a:pPr>
+            <a:endParaRPr lang="es-MX" dirty="0"/>
+          </a:p>
+          <a:p>
+            <a:pPr marL="0" indent="0">
+              <a:lnSpc>
+                <a:spcPct val="150000"/>
+              </a:lnSpc>
+              <a:buNone/>
+            </a:pPr>
+            <a:r>
+              <a:rPr lang="es-MX" b="1" dirty="0"/>
+              <a:t>Sintaxis</a:t>
+            </a:r>
+          </a:p>
+          <a:p>
+            <a:pPr marL="0" indent="0">
+              <a:lnSpc>
+                <a:spcPct val="150000"/>
+              </a:lnSpc>
+              <a:buNone/>
+            </a:pPr>
+            <a:r>
+              <a:rPr lang="en-US" dirty="0"/>
+              <a:t>replace value of Expression1 with Expression2</a:t>
+            </a:r>
+          </a:p>
+        </p:txBody>
+      </p:sp>
+    </p:spTree>
+    <p:extLst>
+      <p:ext uri="{BB962C8B-B14F-4D97-AF65-F5344CB8AC3E}">
+        <p14:creationId xmlns:p14="http://schemas.microsoft.com/office/powerpoint/2010/main" val="2024885848"/>
+      </p:ext>
+    </p:extLst>
+  </p:cSld>
+  <p:clrMapOvr>
+    <a:masterClrMapping/>
+  </p:clrMapOvr>
+</p:sld>
+</file>
+
+<file path=ppt/slides/slide29.xml><?xml version="1.0" encoding="utf-8"?>
+<p:sld xmlns:a="http://schemas.openxmlformats.org/drawingml/2006/main" xmlns:r="http://schemas.openxmlformats.org/officeDocument/2006/relationships" xmlns:p="http://schemas.openxmlformats.org/presentationml/2006/main">
+  <p:cSld>
+    <p:spTree>
+      <p:nvGrpSpPr>
+        <p:cNvPr id="1" name=""/>
+        <p:cNvGrpSpPr/>
+        <p:nvPr/>
+      </p:nvGrpSpPr>
+      <p:grpSpPr>
+        <a:xfrm>
+          <a:off x="0" y="0"/>
+          <a:ext cx="0" cy="0"/>
+          <a:chOff x="0" y="0"/>
+          <a:chExt cx="0" cy="0"/>
+        </a:xfrm>
+      </p:grpSpPr>
+      <p:sp>
+        <p:nvSpPr>
+          <p:cNvPr id="2" name="Title 1">
+            <a:extLst>
+              <a:ext uri="{FF2B5EF4-FFF2-40B4-BE49-F238E27FC236}">
                 <a16:creationId xmlns:a16="http://schemas.microsoft.com/office/drawing/2014/main" id="{3380995F-A5AE-46D5-858B-7E80F124139D}"/>
               </a:ext>
             </a:extLst>
@@ -7944,6 +9367,18 @@
               </a:rPr>
               <a:t>https://docs.microsoft.com/en-us/sql/t-sql/xml/nodes-method-xml-data-type?view=sql-server-2017</a:t>
             </a:r>
+            <a:endParaRPr lang="es-MX" dirty="0"/>
+          </a:p>
+          <a:p>
+            <a:r>
+              <a:rPr lang="es-MX" dirty="0">
+                <a:hlinkClick r:id="rId7"/>
+              </a:rPr>
+              <a:t>https://docs.microsoft.com/es-es/sql/t-sql/xml/modify-method-xml-data-type?view=sql-server-2017</a:t>
+            </a:r>
+            <a:endParaRPr lang="es-MX" dirty="0"/>
+          </a:p>
+          <a:p>
             <a:endParaRPr lang="es-MX" dirty="0"/>
           </a:p>
           <a:p>
@@ -8116,6 +9551,122 @@
     <p:extLst>
       <p:ext uri="{BB962C8B-B14F-4D97-AF65-F5344CB8AC3E}">
         <p14:creationId xmlns:p14="http://schemas.microsoft.com/office/powerpoint/2010/main" val="4014979459"/>
+      </p:ext>
+    </p:extLst>
+  </p:cSld>
+  <p:clrMapOvr>
+    <a:masterClrMapping/>
+  </p:clrMapOvr>
+</p:sld>
+</file>
+
+<file path=ppt/slides/slide30.xml><?xml version="1.0" encoding="utf-8"?>
+<p:sld xmlns:a="http://schemas.openxmlformats.org/drawingml/2006/main" xmlns:r="http://schemas.openxmlformats.org/officeDocument/2006/relationships" xmlns:p="http://schemas.openxmlformats.org/presentationml/2006/main">
+  <p:cSld>
+    <p:spTree>
+      <p:nvGrpSpPr>
+        <p:cNvPr id="1" name=""/>
+        <p:cNvGrpSpPr/>
+        <p:nvPr/>
+      </p:nvGrpSpPr>
+      <p:grpSpPr>
+        <a:xfrm>
+          <a:off x="0" y="0"/>
+          <a:ext cx="0" cy="0"/>
+          <a:chOff x="0" y="0"/>
+          <a:chExt cx="0" cy="0"/>
+        </a:xfrm>
+      </p:grpSpPr>
+      <p:sp>
+        <p:nvSpPr>
+          <p:cNvPr id="2" name="Title 1">
+            <a:extLst>
+              <a:ext uri="{FF2B5EF4-FFF2-40B4-BE49-F238E27FC236}">
+                <a16:creationId xmlns:a16="http://schemas.microsoft.com/office/drawing/2014/main" id="{3380995F-A5AE-46D5-858B-7E80F124139D}"/>
+              </a:ext>
+            </a:extLst>
+          </p:cNvPr>
+          <p:cNvSpPr>
+            <a:spLocks noGrp="1"/>
+          </p:cNvSpPr>
+          <p:nvPr>
+            <p:ph type="title"/>
+          </p:nvPr>
+        </p:nvSpPr>
+        <p:spPr/>
+        <p:txBody>
+          <a:bodyPr/>
+          <a:lstStyle/>
+          <a:p>
+            <a:r>
+              <a:rPr lang="es-MX" dirty="0"/>
+              <a:t>Referencias</a:t>
+            </a:r>
+          </a:p>
+        </p:txBody>
+      </p:sp>
+      <p:sp>
+        <p:nvSpPr>
+          <p:cNvPr id="3" name="Content Placeholder 2">
+            <a:extLst>
+              <a:ext uri="{FF2B5EF4-FFF2-40B4-BE49-F238E27FC236}">
+                <a16:creationId xmlns:a16="http://schemas.microsoft.com/office/drawing/2014/main" id="{13BB7861-1646-436A-9D0B-2BAFBE38E829}"/>
+              </a:ext>
+            </a:extLst>
+          </p:cNvPr>
+          <p:cNvSpPr>
+            <a:spLocks noGrp="1"/>
+          </p:cNvSpPr>
+          <p:nvPr>
+            <p:ph idx="1"/>
+          </p:nvPr>
+        </p:nvSpPr>
+        <p:spPr/>
+        <p:txBody>
+          <a:bodyPr/>
+          <a:lstStyle/>
+          <a:p>
+            <a:r>
+              <a:rPr lang="es-MX" dirty="0">
+                <a:hlinkClick r:id="rId2"/>
+              </a:rPr>
+              <a:t>https://docs.microsoft.com/es-es/sql/t-sql/xml/insert-xml-dml?view=sql-server-2017</a:t>
+            </a:r>
+            <a:endParaRPr lang="es-MX" dirty="0"/>
+          </a:p>
+          <a:p>
+            <a:r>
+              <a:rPr lang="es-MX" dirty="0">
+                <a:hlinkClick r:id="rId3"/>
+              </a:rPr>
+              <a:t>https://docs.microsoft.com/es-es/sql/t-sql/xml/delete-xml-dml?view=sql-server-2017</a:t>
+            </a:r>
+            <a:endParaRPr lang="es-MX" dirty="0"/>
+          </a:p>
+          <a:p>
+            <a:r>
+              <a:rPr lang="es-MX" dirty="0">
+                <a:hlinkClick r:id="rId4"/>
+              </a:rPr>
+              <a:t>https://docs.microsoft.com/es-es/sql/t-sql/xml/replace-value-of-xml-dml?view=sql-server-2017</a:t>
+            </a:r>
+            <a:endParaRPr lang="es-MX" dirty="0"/>
+          </a:p>
+          <a:p>
+            <a:r>
+              <a:rPr lang="es-MX" dirty="0">
+                <a:hlinkClick r:id="rId5"/>
+              </a:rPr>
+              <a:t>https://docs.microsoft.com/es-es/sql/t-sql/xml/exist-method-xml-data-type?view=sql-server-2017</a:t>
+            </a:r>
+            <a:endParaRPr lang="es-MX" dirty="0"/>
+          </a:p>
+        </p:txBody>
+      </p:sp>
+    </p:spTree>
+    <p:extLst>
+      <p:ext uri="{BB962C8B-B14F-4D97-AF65-F5344CB8AC3E}">
+        <p14:creationId xmlns:p14="http://schemas.microsoft.com/office/powerpoint/2010/main" val="1305612515"/>
       </p:ext>
     </p:extLst>
   </p:cSld>

</xml_diff>